<commit_message>
Added slides for introduction, and data introduction
</commit_message>
<xml_diff>
--- a/hc_fraud.pptx
+++ b/hc_fraud.pptx
@@ -5,10 +5,10 @@
     <p:sldMasterId id="2147483744" r:id="rId4"/>
   </p:sldMasterIdLst>
   <p:notesMasterIdLst>
-    <p:notesMasterId r:id="rId11"/>
+    <p:notesMasterId r:id="rId13"/>
   </p:notesMasterIdLst>
   <p:handoutMasterIdLst>
-    <p:handoutMasterId r:id="rId12"/>
+    <p:handoutMasterId r:id="rId14"/>
   </p:handoutMasterIdLst>
   <p:sldIdLst>
     <p:sldId id="256" r:id="rId5"/>
@@ -16,7 +16,9 @@
     <p:sldId id="276" r:id="rId7"/>
     <p:sldId id="277" r:id="rId8"/>
     <p:sldId id="278" r:id="rId9"/>
-    <p:sldId id="274" r:id="rId10"/>
+    <p:sldId id="279" r:id="rId10"/>
+    <p:sldId id="280" r:id="rId11"/>
+    <p:sldId id="274" r:id="rId12"/>
   </p:sldIdLst>
   <p:sldSz cx="12192000" cy="6858000"/>
   <p:notesSz cx="6858000" cy="9144000"/>
@@ -140,7 +142,7 @@
 <file path=ppt/revisionInfo.xml><?xml version="1.0" encoding="utf-8"?>
 <p1510:revInfo xmlns:a="http://schemas.openxmlformats.org/drawingml/2006/main" xmlns:r="http://schemas.openxmlformats.org/officeDocument/2006/relationships" xmlns:p1510="http://schemas.microsoft.com/office/powerpoint/2015/10/main">
   <p1510:revLst>
-    <p1510:client id="{607FBB76-A6AE-4D5C-8B5C-89283B37A43A}" v="51" dt="2022-05-25T16:36:58.216"/>
+    <p1510:client id="{607FBB76-A6AE-4D5C-8B5C-89283B37A43A}" v="55" dt="2022-05-26T13:44:25.200"/>
   </p1510:revLst>
 </p1510:revInfo>
 </file>
@@ -150,7 +152,7 @@
   <pc:docChgLst>
     <pc:chgData name="Suhita Acharya" userId="043aa87a21745673" providerId="LiveId" clId="{607FBB76-A6AE-4D5C-8B5C-89283B37A43A}"/>
     <pc:docChg chg="undo custSel addSld modSld">
-      <pc:chgData name="Suhita Acharya" userId="043aa87a21745673" providerId="LiveId" clId="{607FBB76-A6AE-4D5C-8B5C-89283B37A43A}" dt="2022-05-25T16:46:12.190" v="1593" actId="1076"/>
+      <pc:chgData name="Suhita Acharya" userId="043aa87a21745673" providerId="LiveId" clId="{607FBB76-A6AE-4D5C-8B5C-89283B37A43A}" dt="2022-05-26T13:45:39.745" v="2761" actId="1076"/>
       <pc:docMkLst>
         <pc:docMk/>
       </pc:docMkLst>
@@ -450,6 +452,340 @@
             <pc:docMk/>
             <pc:sldMk cId="3669305936" sldId="278"/>
             <ac:picMk id="10" creationId="{A53ED3FC-3BE8-4F1F-BEF1-74B1C721718A}"/>
+          </ac:picMkLst>
+        </pc:picChg>
+      </pc:sldChg>
+      <pc:sldChg chg="addSp delSp modSp new mod setBg setClrOvrMap">
+        <pc:chgData name="Suhita Acharya" userId="043aa87a21745673" providerId="LiveId" clId="{607FBB76-A6AE-4D5C-8B5C-89283B37A43A}" dt="2022-05-25T18:03:21.575" v="2526" actId="20577"/>
+        <pc:sldMkLst>
+          <pc:docMk/>
+          <pc:sldMk cId="3720491222" sldId="279"/>
+        </pc:sldMkLst>
+        <pc:spChg chg="mod">
+          <ac:chgData name="Suhita Acharya" userId="043aa87a21745673" providerId="LiveId" clId="{607FBB76-A6AE-4D5C-8B5C-89283B37A43A}" dt="2022-05-25T18:02:57.157" v="2524" actId="26606"/>
+          <ac:spMkLst>
+            <pc:docMk/>
+            <pc:sldMk cId="3720491222" sldId="279"/>
+            <ac:spMk id="2" creationId="{5F1200C3-E577-EE07-1600-5D17B5E9D7F9}"/>
+          </ac:spMkLst>
+        </pc:spChg>
+        <pc:spChg chg="add del mod">
+          <ac:chgData name="Suhita Acharya" userId="043aa87a21745673" providerId="LiveId" clId="{607FBB76-A6AE-4D5C-8B5C-89283B37A43A}" dt="2022-05-25T18:03:21.575" v="2526" actId="20577"/>
+          <ac:spMkLst>
+            <pc:docMk/>
+            <pc:sldMk cId="3720491222" sldId="279"/>
+            <ac:spMk id="3" creationId="{19A1C725-FD9C-C017-578A-632937CDA398}"/>
+          </ac:spMkLst>
+        </pc:spChg>
+        <pc:spChg chg="add mod">
+          <ac:chgData name="Suhita Acharya" userId="043aa87a21745673" providerId="LiveId" clId="{607FBB76-A6AE-4D5C-8B5C-89283B37A43A}" dt="2022-05-25T18:02:57.157" v="2524" actId="26606"/>
+          <ac:spMkLst>
+            <pc:docMk/>
+            <pc:sldMk cId="3720491222" sldId="279"/>
+            <ac:spMk id="4" creationId="{DD2F982C-82E2-A7A3-46F8-856B0A7D8649}"/>
+          </ac:spMkLst>
+        </pc:spChg>
+        <pc:spChg chg="add del">
+          <ac:chgData name="Suhita Acharya" userId="043aa87a21745673" providerId="LiveId" clId="{607FBB76-A6AE-4D5C-8B5C-89283B37A43A}" dt="2022-05-25T18:02:19.039" v="2520" actId="26606"/>
+          <ac:spMkLst>
+            <pc:docMk/>
+            <pc:sldMk cId="3720491222" sldId="279"/>
+            <ac:spMk id="11" creationId="{50E53EDA-3B94-4F6B-9E86-D3BB9EBB9616}"/>
+          </ac:spMkLst>
+        </pc:spChg>
+        <pc:spChg chg="add del">
+          <ac:chgData name="Suhita Acharya" userId="043aa87a21745673" providerId="LiveId" clId="{607FBB76-A6AE-4D5C-8B5C-89283B37A43A}" dt="2022-05-25T18:02:09.525" v="2516" actId="26606"/>
+          <ac:spMkLst>
+            <pc:docMk/>
+            <pc:sldMk cId="3720491222" sldId="279"/>
+            <ac:spMk id="12" creationId="{4117F0C1-BCBB-40C7-99D6-F703E7A4B5F3}"/>
+          </ac:spMkLst>
+        </pc:spChg>
+        <pc:spChg chg="add del">
+          <ac:chgData name="Suhita Acharya" userId="043aa87a21745673" providerId="LiveId" clId="{607FBB76-A6AE-4D5C-8B5C-89283B37A43A}" dt="2022-05-25T18:02:09.525" v="2516" actId="26606"/>
+          <ac:spMkLst>
+            <pc:docMk/>
+            <pc:sldMk cId="3720491222" sldId="279"/>
+            <ac:spMk id="14" creationId="{D1A5D8BC-B41A-4E96-91C4-D60F5162257E}"/>
+          </ac:spMkLst>
+        </pc:spChg>
+        <pc:spChg chg="add del">
+          <ac:chgData name="Suhita Acharya" userId="043aa87a21745673" providerId="LiveId" clId="{607FBB76-A6AE-4D5C-8B5C-89283B37A43A}" dt="2022-05-25T18:02:09.525" v="2516" actId="26606"/>
+          <ac:spMkLst>
+            <pc:docMk/>
+            <pc:sldMk cId="3720491222" sldId="279"/>
+            <ac:spMk id="18" creationId="{51287385-D3EA-47A8-A127-6061791ADBB6}"/>
+          </ac:spMkLst>
+        </pc:spChg>
+        <pc:spChg chg="add del">
+          <ac:chgData name="Suhita Acharya" userId="043aa87a21745673" providerId="LiveId" clId="{607FBB76-A6AE-4D5C-8B5C-89283B37A43A}" dt="2022-05-25T18:02:13.059" v="2518" actId="26606"/>
+          <ac:spMkLst>
+            <pc:docMk/>
+            <pc:sldMk cId="3720491222" sldId="279"/>
+            <ac:spMk id="21" creationId="{CFF5BED3-4EE4-425F-A016-C272586B88E5}"/>
+          </ac:spMkLst>
+        </pc:spChg>
+        <pc:spChg chg="add del">
+          <ac:chgData name="Suhita Acharya" userId="043aa87a21745673" providerId="LiveId" clId="{607FBB76-A6AE-4D5C-8B5C-89283B37A43A}" dt="2022-05-25T18:02:13.059" v="2518" actId="26606"/>
+          <ac:spMkLst>
+            <pc:docMk/>
+            <pc:sldMk cId="3720491222" sldId="279"/>
+            <ac:spMk id="22" creationId="{D856B4CA-4519-432C-ABFD-F2AE5D70E09C}"/>
+          </ac:spMkLst>
+        </pc:spChg>
+        <pc:spChg chg="add del">
+          <ac:chgData name="Suhita Acharya" userId="043aa87a21745673" providerId="LiveId" clId="{607FBB76-A6AE-4D5C-8B5C-89283B37A43A}" dt="2022-05-25T18:02:13.059" v="2518" actId="26606"/>
+          <ac:spMkLst>
+            <pc:docMk/>
+            <pc:sldMk cId="3720491222" sldId="279"/>
+            <ac:spMk id="23" creationId="{61D03B64-A2F8-4473-8457-9A6A36B67B89}"/>
+          </ac:spMkLst>
+        </pc:spChg>
+        <pc:spChg chg="add del">
+          <ac:chgData name="Suhita Acharya" userId="043aa87a21745673" providerId="LiveId" clId="{607FBB76-A6AE-4D5C-8B5C-89283B37A43A}" dt="2022-05-25T18:02:19.039" v="2520" actId="26606"/>
+          <ac:spMkLst>
+            <pc:docMk/>
+            <pc:sldMk cId="3720491222" sldId="279"/>
+            <ac:spMk id="27" creationId="{19A1C725-FD9C-C017-578A-632937CDA398}"/>
+          </ac:spMkLst>
+        </pc:spChg>
+        <pc:spChg chg="add del">
+          <ac:chgData name="Suhita Acharya" userId="043aa87a21745673" providerId="LiveId" clId="{607FBB76-A6AE-4D5C-8B5C-89283B37A43A}" dt="2022-05-25T18:02:30.326" v="2522" actId="26606"/>
+          <ac:spMkLst>
+            <pc:docMk/>
+            <pc:sldMk cId="3720491222" sldId="279"/>
+            <ac:spMk id="30" creationId="{6A166780-9337-4437-95D3-5EA9D55AAAC5}"/>
+          </ac:spMkLst>
+        </pc:spChg>
+        <pc:spChg chg="add del">
+          <ac:chgData name="Suhita Acharya" userId="043aa87a21745673" providerId="LiveId" clId="{607FBB76-A6AE-4D5C-8B5C-89283B37A43A}" dt="2022-05-25T18:02:30.326" v="2522" actId="26606"/>
+          <ac:spMkLst>
+            <pc:docMk/>
+            <pc:sldMk cId="3720491222" sldId="279"/>
+            <ac:spMk id="31" creationId="{EB3D0F40-BF1F-4120-945D-90C5AAD6E35A}"/>
+          </ac:spMkLst>
+        </pc:spChg>
+        <pc:spChg chg="add del">
+          <ac:chgData name="Suhita Acharya" userId="043aa87a21745673" providerId="LiveId" clId="{607FBB76-A6AE-4D5C-8B5C-89283B37A43A}" dt="2022-05-25T18:02:30.326" v="2522" actId="26606"/>
+          <ac:spMkLst>
+            <pc:docMk/>
+            <pc:sldMk cId="3720491222" sldId="279"/>
+            <ac:spMk id="33" creationId="{66F4F323-644B-4A47-97E9-BFB73840F402}"/>
+          </ac:spMkLst>
+        </pc:spChg>
+        <pc:spChg chg="add del">
+          <ac:chgData name="Suhita Acharya" userId="043aa87a21745673" providerId="LiveId" clId="{607FBB76-A6AE-4D5C-8B5C-89283B37A43A}" dt="2022-05-25T18:02:57.157" v="2524" actId="26606"/>
+          <ac:spMkLst>
+            <pc:docMk/>
+            <pc:sldMk cId="3720491222" sldId="279"/>
+            <ac:spMk id="37" creationId="{E1EB41F2-E181-4D4D-9131-A30F6B0AE596}"/>
+          </ac:spMkLst>
+        </pc:spChg>
+        <pc:spChg chg="add del">
+          <ac:chgData name="Suhita Acharya" userId="043aa87a21745673" providerId="LiveId" clId="{607FBB76-A6AE-4D5C-8B5C-89283B37A43A}" dt="2022-05-25T18:02:57.157" v="2524" actId="26606"/>
+          <ac:spMkLst>
+            <pc:docMk/>
+            <pc:sldMk cId="3720491222" sldId="279"/>
+            <ac:spMk id="38" creationId="{3D63CC92-C517-4C71-9222-4579252CD62E}"/>
+          </ac:spMkLst>
+        </pc:spChg>
+        <pc:spChg chg="add del">
+          <ac:chgData name="Suhita Acharya" userId="043aa87a21745673" providerId="LiveId" clId="{607FBB76-A6AE-4D5C-8B5C-89283B37A43A}" dt="2022-05-25T18:02:57.157" v="2524" actId="26606"/>
+          <ac:spMkLst>
+            <pc:docMk/>
+            <pc:sldMk cId="3720491222" sldId="279"/>
+            <ac:spMk id="39" creationId="{19A1C725-FD9C-C017-578A-632937CDA398}"/>
+          </ac:spMkLst>
+        </pc:spChg>
+        <pc:graphicFrameChg chg="add del">
+          <ac:chgData name="Suhita Acharya" userId="043aa87a21745673" providerId="LiveId" clId="{607FBB76-A6AE-4D5C-8B5C-89283B37A43A}" dt="2022-05-25T18:02:09.525" v="2516" actId="26606"/>
+          <ac:graphicFrameMkLst>
+            <pc:docMk/>
+            <pc:sldMk cId="3720491222" sldId="279"/>
+            <ac:graphicFrameMk id="6" creationId="{059DA4B3-B2F9-A10D-A416-7CA237E9122F}"/>
+          </ac:graphicFrameMkLst>
+        </pc:graphicFrameChg>
+        <pc:graphicFrameChg chg="add del">
+          <ac:chgData name="Suhita Acharya" userId="043aa87a21745673" providerId="LiveId" clId="{607FBB76-A6AE-4D5C-8B5C-89283B37A43A}" dt="2022-05-25T18:02:13.059" v="2518" actId="26606"/>
+          <ac:graphicFrameMkLst>
+            <pc:docMk/>
+            <pc:sldMk cId="3720491222" sldId="279"/>
+            <ac:graphicFrameMk id="25" creationId="{7B0A3CB5-4B85-A178-FD74-25A3CBF9B577}"/>
+          </ac:graphicFrameMkLst>
+        </pc:graphicFrameChg>
+        <pc:graphicFrameChg chg="add del">
+          <ac:chgData name="Suhita Acharya" userId="043aa87a21745673" providerId="LiveId" clId="{607FBB76-A6AE-4D5C-8B5C-89283B37A43A}" dt="2022-05-25T18:02:30.326" v="2522" actId="26606"/>
+          <ac:graphicFrameMkLst>
+            <pc:docMk/>
+            <pc:sldMk cId="3720491222" sldId="279"/>
+            <ac:graphicFrameMk id="34" creationId="{74E22ABE-8F05-006A-3D59-F40EB947AD3E}"/>
+          </ac:graphicFrameMkLst>
+        </pc:graphicFrameChg>
+        <pc:picChg chg="add del">
+          <ac:chgData name="Suhita Acharya" userId="043aa87a21745673" providerId="LiveId" clId="{607FBB76-A6AE-4D5C-8B5C-89283B37A43A}" dt="2022-05-25T18:02:19.039" v="2520" actId="26606"/>
+          <ac:picMkLst>
+            <pc:docMk/>
+            <pc:sldMk cId="3720491222" sldId="279"/>
+            <ac:picMk id="9" creationId="{A17F7527-5AC0-479A-B79F-9CF463410490}"/>
+          </ac:picMkLst>
+        </pc:picChg>
+        <pc:picChg chg="add del">
+          <ac:chgData name="Suhita Acharya" userId="043aa87a21745673" providerId="LiveId" clId="{607FBB76-A6AE-4D5C-8B5C-89283B37A43A}" dt="2022-05-25T18:02:09.525" v="2516" actId="26606"/>
+          <ac:picMkLst>
+            <pc:docMk/>
+            <pc:sldMk cId="3720491222" sldId="279"/>
+            <ac:picMk id="10" creationId="{42476583-CC33-45CE-B51B-215B5673CD22}"/>
+          </ac:picMkLst>
+        </pc:picChg>
+        <pc:picChg chg="add del">
+          <ac:chgData name="Suhita Acharya" userId="043aa87a21745673" providerId="LiveId" clId="{607FBB76-A6AE-4D5C-8B5C-89283B37A43A}" dt="2022-05-25T18:02:57.157" v="2524" actId="26606"/>
+          <ac:picMkLst>
+            <pc:docMk/>
+            <pc:sldMk cId="3720491222" sldId="279"/>
+            <ac:picMk id="15" creationId="{40A39FDC-39F4-4CB7-873B-8D786EC02516}"/>
+          </ac:picMkLst>
+        </pc:picChg>
+        <pc:picChg chg="add del">
+          <ac:chgData name="Suhita Acharya" userId="043aa87a21745673" providerId="LiveId" clId="{607FBB76-A6AE-4D5C-8B5C-89283B37A43A}" dt="2022-05-25T18:02:09.525" v="2516" actId="26606"/>
+          <ac:picMkLst>
+            <pc:docMk/>
+            <pc:sldMk cId="3720491222" sldId="279"/>
+            <ac:picMk id="16" creationId="{0D321D5F-FA18-4271-9EAA-0BEA14116BB5}"/>
+          </ac:picMkLst>
+        </pc:picChg>
+        <pc:picChg chg="add del">
+          <ac:chgData name="Suhita Acharya" userId="043aa87a21745673" providerId="LiveId" clId="{607FBB76-A6AE-4D5C-8B5C-89283B37A43A}" dt="2022-05-25T18:02:13.059" v="2518" actId="26606"/>
+          <ac:picMkLst>
+            <pc:docMk/>
+            <pc:sldMk cId="3720491222" sldId="279"/>
+            <ac:picMk id="20" creationId="{42476583-CC33-45CE-B51B-215B5673CD22}"/>
+          </ac:picMkLst>
+        </pc:picChg>
+        <pc:picChg chg="add del">
+          <ac:chgData name="Suhita Acharya" userId="043aa87a21745673" providerId="LiveId" clId="{607FBB76-A6AE-4D5C-8B5C-89283B37A43A}" dt="2022-05-25T18:02:13.059" v="2518" actId="26606"/>
+          <ac:picMkLst>
+            <pc:docMk/>
+            <pc:sldMk cId="3720491222" sldId="279"/>
+            <ac:picMk id="24" creationId="{01C3CE7E-C09F-4DAB-A9B8-00CB40334B33}"/>
+          </ac:picMkLst>
+        </pc:picChg>
+        <pc:picChg chg="add del">
+          <ac:chgData name="Suhita Acharya" userId="043aa87a21745673" providerId="LiveId" clId="{607FBB76-A6AE-4D5C-8B5C-89283B37A43A}" dt="2022-05-25T18:02:30.326" v="2522" actId="26606"/>
+          <ac:picMkLst>
+            <pc:docMk/>
+            <pc:sldMk cId="3720491222" sldId="279"/>
+            <ac:picMk id="29" creationId="{42476583-CC33-45CE-B51B-215B5673CD22}"/>
+          </ac:picMkLst>
+        </pc:picChg>
+        <pc:picChg chg="add del">
+          <ac:chgData name="Suhita Acharya" userId="043aa87a21745673" providerId="LiveId" clId="{607FBB76-A6AE-4D5C-8B5C-89283B37A43A}" dt="2022-05-25T18:02:30.326" v="2522" actId="26606"/>
+          <ac:picMkLst>
+            <pc:docMk/>
+            <pc:sldMk cId="3720491222" sldId="279"/>
+            <ac:picMk id="32" creationId="{15640A69-3748-450C-8DDB-B2051AC04BC7}"/>
+          </ac:picMkLst>
+        </pc:picChg>
+        <pc:picChg chg="add del">
+          <ac:chgData name="Suhita Acharya" userId="043aa87a21745673" providerId="LiveId" clId="{607FBB76-A6AE-4D5C-8B5C-89283B37A43A}" dt="2022-05-25T18:02:57.157" v="2524" actId="26606"/>
+          <ac:picMkLst>
+            <pc:docMk/>
+            <pc:sldMk cId="3720491222" sldId="279"/>
+            <ac:picMk id="36" creationId="{A17F7527-5AC0-479A-B79F-9CF463410490}"/>
+          </ac:picMkLst>
+        </pc:picChg>
+        <pc:cxnChg chg="add del">
+          <ac:chgData name="Suhita Acharya" userId="043aa87a21745673" providerId="LiveId" clId="{607FBB76-A6AE-4D5C-8B5C-89283B37A43A}" dt="2022-05-25T18:02:19.039" v="2520" actId="26606"/>
+          <ac:cxnSpMkLst>
+            <pc:docMk/>
+            <pc:sldMk cId="3720491222" sldId="279"/>
+            <ac:cxnSpMk id="13" creationId="{30EFD79F-7790-479B-B7DB-BD0D8C101DDD}"/>
+          </ac:cxnSpMkLst>
+        </pc:cxnChg>
+      </pc:sldChg>
+      <pc:sldChg chg="addSp delSp modSp new mod setBg">
+        <pc:chgData name="Suhita Acharya" userId="043aa87a21745673" providerId="LiveId" clId="{607FBB76-A6AE-4D5C-8B5C-89283B37A43A}" dt="2022-05-26T13:45:39.745" v="2761" actId="1076"/>
+        <pc:sldMkLst>
+          <pc:docMk/>
+          <pc:sldMk cId="1693661842" sldId="280"/>
+        </pc:sldMkLst>
+        <pc:spChg chg="mod">
+          <ac:chgData name="Suhita Acharya" userId="043aa87a21745673" providerId="LiveId" clId="{607FBB76-A6AE-4D5C-8B5C-89283B37A43A}" dt="2022-05-26T13:45:39.745" v="2761" actId="1076"/>
+          <ac:spMkLst>
+            <pc:docMk/>
+            <pc:sldMk cId="1693661842" sldId="280"/>
+            <ac:spMk id="2" creationId="{E357678B-1A1A-7C0C-5FD4-FCE94B1EBC3D}"/>
+          </ac:spMkLst>
+        </pc:spChg>
+        <pc:spChg chg="add mod">
+          <ac:chgData name="Suhita Acharya" userId="043aa87a21745673" providerId="LiveId" clId="{607FBB76-A6AE-4D5C-8B5C-89283B37A43A}" dt="2022-05-26T13:45:36.684" v="2760" actId="1076"/>
+          <ac:spMkLst>
+            <pc:docMk/>
+            <pc:sldMk cId="1693661842" sldId="280"/>
+            <ac:spMk id="9" creationId="{C2639FFB-CADA-F744-7763-BA6F9BCB2618}"/>
+          </ac:spMkLst>
+        </pc:spChg>
+        <pc:spChg chg="add mod">
+          <ac:chgData name="Suhita Acharya" userId="043aa87a21745673" providerId="LiveId" clId="{607FBB76-A6AE-4D5C-8B5C-89283B37A43A}" dt="2022-05-26T13:45:07.064" v="2756" actId="12"/>
+          <ac:spMkLst>
+            <pc:docMk/>
+            <pc:sldMk cId="1693661842" sldId="280"/>
+            <ac:spMk id="10" creationId="{EE8FFD8F-8B25-49FD-F70D-2FE73646ABC0}"/>
+          </ac:spMkLst>
+        </pc:spChg>
+        <pc:spChg chg="add del">
+          <ac:chgData name="Suhita Acharya" userId="043aa87a21745673" providerId="LiveId" clId="{607FBB76-A6AE-4D5C-8B5C-89283B37A43A}" dt="2022-05-25T18:21:37.430" v="2590" actId="26606"/>
+          <ac:spMkLst>
+            <pc:docMk/>
+            <pc:sldMk cId="1693661842" sldId="280"/>
+            <ac:spMk id="15" creationId="{8B10BF6C-3665-4F44-AECF-93A3A986EEFF}"/>
+          </ac:spMkLst>
+        </pc:spChg>
+        <pc:spChg chg="add del">
+          <ac:chgData name="Suhita Acharya" userId="043aa87a21745673" providerId="LiveId" clId="{607FBB76-A6AE-4D5C-8B5C-89283B37A43A}" dt="2022-05-25T18:21:37.430" v="2590" actId="26606"/>
+          <ac:spMkLst>
+            <pc:docMk/>
+            <pc:sldMk cId="1693661842" sldId="280"/>
+            <ac:spMk id="17" creationId="{2686FD45-663C-4668-8418-20199A171676}"/>
+          </ac:spMkLst>
+        </pc:spChg>
+        <pc:spChg chg="add del">
+          <ac:chgData name="Suhita Acharya" userId="043aa87a21745673" providerId="LiveId" clId="{607FBB76-A6AE-4D5C-8B5C-89283B37A43A}" dt="2022-05-25T18:21:37.430" v="2590" actId="26606"/>
+          <ac:spMkLst>
+            <pc:docMk/>
+            <pc:sldMk cId="1693661842" sldId="280"/>
+            <ac:spMk id="19" creationId="{812F6BC3-2C27-4D47-B3FC-14C36ABB720A}"/>
+          </ac:spMkLst>
+        </pc:spChg>
+        <pc:picChg chg="add mod ord">
+          <ac:chgData name="Suhita Acharya" userId="043aa87a21745673" providerId="LiveId" clId="{607FBB76-A6AE-4D5C-8B5C-89283B37A43A}" dt="2022-05-26T13:45:30.642" v="2758" actId="1076"/>
+          <ac:picMkLst>
+            <pc:docMk/>
+            <pc:sldMk cId="1693661842" sldId="280"/>
+            <ac:picMk id="4" creationId="{ED85C09D-8BF6-16FD-1EA0-B3A20F5AAFBB}"/>
+          </ac:picMkLst>
+        </pc:picChg>
+        <pc:picChg chg="add mod">
+          <ac:chgData name="Suhita Acharya" userId="043aa87a21745673" providerId="LiveId" clId="{607FBB76-A6AE-4D5C-8B5C-89283B37A43A}" dt="2022-05-26T13:45:32.826" v="2759" actId="1076"/>
+          <ac:picMkLst>
+            <pc:docMk/>
+            <pc:sldMk cId="1693661842" sldId="280"/>
+            <ac:picMk id="6" creationId="{70ED257C-811C-2957-678E-463EB3291ADF}"/>
+          </ac:picMkLst>
+        </pc:picChg>
+        <pc:picChg chg="add mod">
+          <ac:chgData name="Suhita Acharya" userId="043aa87a21745673" providerId="LiveId" clId="{607FBB76-A6AE-4D5C-8B5C-89283B37A43A}" dt="2022-05-26T13:45:26.983" v="2757" actId="1076"/>
+          <ac:picMkLst>
+            <pc:docMk/>
+            <pc:sldMk cId="1693661842" sldId="280"/>
+            <ac:picMk id="8" creationId="{D77B47D8-A6ED-931E-7055-92F949E772C1}"/>
+          </ac:picMkLst>
+        </pc:picChg>
+        <pc:picChg chg="add del">
+          <ac:chgData name="Suhita Acharya" userId="043aa87a21745673" providerId="LiveId" clId="{607FBB76-A6AE-4D5C-8B5C-89283B37A43A}" dt="2022-05-25T18:21:37.430" v="2590" actId="26606"/>
+          <ac:picMkLst>
+            <pc:docMk/>
+            <pc:sldMk cId="1693661842" sldId="280"/>
+            <ac:picMk id="13" creationId="{E5AA88FA-FA9B-40A0-AB33-86E7729DA88E}"/>
           </ac:picMkLst>
         </pc:picChg>
       </pc:sldChg>
@@ -5787,7 +6123,91 @@
           <a:p>
             <a:fld id="{F3544625-0ADF-4414-89A2-9E135F0C849F}" type="slidenum">
               <a:rPr lang="en-US" smtClean="0"/>
-              <a:t>6</a:t>
+              <a:t>7</a:t>
+            </a:fld>
+            <a:endParaRPr lang="en-US" dirty="0"/>
+          </a:p>
+        </p:txBody>
+      </p:sp>
+    </p:spTree>
+    <p:extLst>
+      <p:ext uri="{BB962C8B-B14F-4D97-AF65-F5344CB8AC3E}">
+        <p14:creationId xmlns:p14="http://schemas.microsoft.com/office/powerpoint/2010/main" val="1060191612"/>
+      </p:ext>
+    </p:extLst>
+  </p:cSld>
+  <p:clrMapOvr>
+    <a:masterClrMapping/>
+  </p:clrMapOvr>
+</p:notes>
+</file>
+
+<file path=ppt/notesSlides/notesSlide6.xml><?xml version="1.0" encoding="utf-8"?>
+<p:notes xmlns:a="http://schemas.openxmlformats.org/drawingml/2006/main" xmlns:r="http://schemas.openxmlformats.org/officeDocument/2006/relationships" xmlns:p="http://schemas.openxmlformats.org/presentationml/2006/main">
+  <p:cSld>
+    <p:spTree>
+      <p:nvGrpSpPr>
+        <p:cNvPr id="1" name=""/>
+        <p:cNvGrpSpPr/>
+        <p:nvPr/>
+      </p:nvGrpSpPr>
+      <p:grpSpPr>
+        <a:xfrm>
+          <a:off x="0" y="0"/>
+          <a:ext cx="0" cy="0"/>
+          <a:chOff x="0" y="0"/>
+          <a:chExt cx="0" cy="0"/>
+        </a:xfrm>
+      </p:grpSpPr>
+      <p:sp>
+        <p:nvSpPr>
+          <p:cNvPr id="2" name="Slide Image Placeholder 1"/>
+          <p:cNvSpPr>
+            <a:spLocks noGrp="1" noRot="1" noChangeAspect="1"/>
+          </p:cNvSpPr>
+          <p:nvPr>
+            <p:ph type="sldImg"/>
+          </p:nvPr>
+        </p:nvSpPr>
+        <p:spPr/>
+      </p:sp>
+      <p:sp>
+        <p:nvSpPr>
+          <p:cNvPr id="3" name="Notes Placeholder 2"/>
+          <p:cNvSpPr>
+            <a:spLocks noGrp="1"/>
+          </p:cNvSpPr>
+          <p:nvPr>
+            <p:ph type="body" idx="1"/>
+          </p:nvPr>
+        </p:nvSpPr>
+        <p:spPr/>
+        <p:txBody>
+          <a:bodyPr/>
+          <a:lstStyle/>
+          <a:p>
+            <a:endParaRPr lang="en-US" dirty="0"/>
+          </a:p>
+        </p:txBody>
+      </p:sp>
+      <p:sp>
+        <p:nvSpPr>
+          <p:cNvPr id="4" name="Slide Number Placeholder 3"/>
+          <p:cNvSpPr>
+            <a:spLocks noGrp="1"/>
+          </p:cNvSpPr>
+          <p:nvPr>
+            <p:ph type="sldNum" sz="quarter" idx="5"/>
+          </p:nvPr>
+        </p:nvSpPr>
+        <p:spPr/>
+        <p:txBody>
+          <a:bodyPr/>
+          <a:lstStyle/>
+          <a:p>
+            <a:fld id="{F3544625-0ADF-4414-89A2-9E135F0C849F}" type="slidenum">
+              <a:rPr lang="en-US" smtClean="0"/>
+              <a:t>8</a:t>
             </a:fld>
             <a:endParaRPr lang="en-US" dirty="0"/>
           </a:p>
@@ -21932,6 +22352,641 @@
           <a:chExt cx="0" cy="0"/>
         </a:xfrm>
       </p:grpSpPr>
+      <p:sp>
+        <p:nvSpPr>
+          <p:cNvPr id="2" name="Title 1">
+            <a:extLst>
+              <a:ext uri="{FF2B5EF4-FFF2-40B4-BE49-F238E27FC236}">
+                <a16:creationId xmlns:a16="http://schemas.microsoft.com/office/drawing/2014/main" id="{5F1200C3-E577-EE07-1600-5D17B5E9D7F9}"/>
+              </a:ext>
+            </a:extLst>
+          </p:cNvPr>
+          <p:cNvSpPr>
+            <a:spLocks noGrp="1"/>
+          </p:cNvSpPr>
+          <p:nvPr>
+            <p:ph type="title"/>
+          </p:nvPr>
+        </p:nvSpPr>
+        <p:spPr>
+          <a:xfrm>
+            <a:off x="666750" y="254003"/>
+            <a:ext cx="10680699" cy="774700"/>
+          </a:xfrm>
+        </p:spPr>
+        <p:txBody>
+          <a:bodyPr/>
+          <a:lstStyle/>
+          <a:p>
+            <a:r>
+              <a:rPr lang="en-US" b="1"/>
+              <a:t>DATA PREPROCESSING</a:t>
+            </a:r>
+            <a:endParaRPr lang="en-US" b="1" dirty="0"/>
+          </a:p>
+        </p:txBody>
+      </p:sp>
+      <p:sp>
+        <p:nvSpPr>
+          <p:cNvPr id="3" name="TextBox 2">
+            <a:extLst>
+              <a:ext uri="{FF2B5EF4-FFF2-40B4-BE49-F238E27FC236}">
+                <a16:creationId xmlns:a16="http://schemas.microsoft.com/office/drawing/2014/main" id="{19A1C725-FD9C-C017-578A-632937CDA398}"/>
+              </a:ext>
+            </a:extLst>
+          </p:cNvPr>
+          <p:cNvSpPr txBox="1"/>
+          <p:nvPr/>
+        </p:nvSpPr>
+        <p:spPr>
+          <a:xfrm>
+            <a:off x="685800" y="1546998"/>
+            <a:ext cx="5321299" cy="4247317"/>
+          </a:xfrm>
+          <a:prstGeom prst="rect">
+            <a:avLst/>
+          </a:prstGeom>
+          <a:noFill/>
+        </p:spPr>
+        <p:txBody>
+          <a:bodyPr wrap="square" rtlCol="0">
+            <a:spAutoFit/>
+          </a:bodyPr>
+          <a:lstStyle/>
+          <a:p>
+            <a:pPr marL="285750" indent="-285750">
+              <a:buFont typeface="Wingdings" panose="05000000000000000000" pitchFamily="2" charset="2"/>
+              <a:buChar char="q"/>
+            </a:pPr>
+            <a:r>
+              <a:rPr lang="en-US" dirty="0"/>
+              <a:t>Missing Data Imputed:</a:t>
+            </a:r>
+          </a:p>
+          <a:p>
+            <a:pPr marL="742950" lvl="1" indent="-285750">
+              <a:buFont typeface="Wingdings" panose="05000000000000000000" pitchFamily="2" charset="2"/>
+              <a:buChar char="§"/>
+            </a:pPr>
+            <a:r>
+              <a:rPr lang="en-US" dirty="0"/>
+              <a:t>Beneficiary:</a:t>
+            </a:r>
+          </a:p>
+          <a:p>
+            <a:pPr marL="742950" lvl="1" indent="-285750">
+              <a:buFont typeface="Wingdings" panose="05000000000000000000" pitchFamily="2" charset="2"/>
+              <a:buChar char="§"/>
+            </a:pPr>
+            <a:r>
+              <a:rPr lang="en-US" dirty="0"/>
+              <a:t>Inpatient:</a:t>
+            </a:r>
+          </a:p>
+          <a:p>
+            <a:pPr marL="742950" lvl="1" indent="-285750">
+              <a:buFont typeface="Wingdings" panose="05000000000000000000" pitchFamily="2" charset="2"/>
+              <a:buChar char="§"/>
+            </a:pPr>
+            <a:r>
+              <a:rPr lang="en-US" dirty="0"/>
+              <a:t>Outpatient:</a:t>
+            </a:r>
+          </a:p>
+          <a:p>
+            <a:pPr marL="285750" indent="-285750">
+              <a:buFont typeface="Wingdings" panose="05000000000000000000" pitchFamily="2" charset="2"/>
+              <a:buChar char="q"/>
+            </a:pPr>
+            <a:r>
+              <a:rPr lang="en-US" dirty="0"/>
+              <a:t>Label Encoding: All categorical features</a:t>
+            </a:r>
+          </a:p>
+          <a:p>
+            <a:pPr marL="285750" indent="-285750">
+              <a:buFont typeface="Wingdings" panose="05000000000000000000" pitchFamily="2" charset="2"/>
+              <a:buChar char="q"/>
+            </a:pPr>
+            <a:r>
+              <a:rPr lang="en-US" dirty="0"/>
+              <a:t>New Feature Creation:</a:t>
+            </a:r>
+          </a:p>
+          <a:p>
+            <a:pPr marL="742950" lvl="1" indent="-285750">
+              <a:buFont typeface="Wingdings" panose="05000000000000000000" pitchFamily="2" charset="2"/>
+              <a:buChar char="§"/>
+            </a:pPr>
+            <a:r>
+              <a:rPr lang="en-US" dirty="0"/>
+              <a:t>Deceased, </a:t>
+            </a:r>
+            <a:r>
+              <a:rPr lang="en-US" dirty="0" err="1"/>
+              <a:t>Tot_Reimbursed_Amt</a:t>
+            </a:r>
+            <a:r>
+              <a:rPr lang="en-US" dirty="0"/>
+              <a:t>, </a:t>
+            </a:r>
+            <a:r>
+              <a:rPr lang="en-US" dirty="0" err="1"/>
+              <a:t>Hospital_Stay</a:t>
+            </a:r>
+            <a:r>
+              <a:rPr lang="en-US" dirty="0"/>
+              <a:t>, </a:t>
+            </a:r>
+            <a:r>
+              <a:rPr lang="en-US" dirty="0" err="1"/>
+              <a:t>Claim_Duration</a:t>
+            </a:r>
+            <a:r>
+              <a:rPr lang="en-US" dirty="0"/>
+              <a:t>, </a:t>
+            </a:r>
+            <a:r>
+              <a:rPr lang="en-US" dirty="0" err="1"/>
+              <a:t>Physician_Count</a:t>
+            </a:r>
+            <a:r>
+              <a:rPr lang="en-US" dirty="0"/>
+              <a:t>, </a:t>
+            </a:r>
+            <a:r>
+              <a:rPr lang="en-US" dirty="0" err="1"/>
+              <a:t>Claim_Count</a:t>
+            </a:r>
+            <a:r>
+              <a:rPr lang="en-US" dirty="0"/>
+              <a:t>, </a:t>
+            </a:r>
+            <a:r>
+              <a:rPr lang="en-US" dirty="0" err="1"/>
+              <a:t>Chr_Cond_Count</a:t>
+            </a:r>
+            <a:r>
+              <a:rPr lang="en-US" dirty="0"/>
+              <a:t>, etc.</a:t>
+            </a:r>
+          </a:p>
+          <a:p>
+            <a:pPr marL="285750" indent="-285750">
+              <a:buFont typeface="Wingdings" panose="05000000000000000000" pitchFamily="2" charset="2"/>
+              <a:buChar char="q"/>
+            </a:pPr>
+            <a:r>
+              <a:rPr lang="en-US" dirty="0"/>
+              <a:t>Dropped features:</a:t>
+            </a:r>
+          </a:p>
+          <a:p>
+            <a:pPr marL="742950" lvl="1" indent="-285750">
+              <a:buFont typeface="Wingdings" panose="05000000000000000000" pitchFamily="2" charset="2"/>
+              <a:buChar char="§"/>
+            </a:pPr>
+            <a:r>
+              <a:rPr lang="en-US" dirty="0"/>
+              <a:t>With high null values, ones from which other features were created, etc.</a:t>
+            </a:r>
+          </a:p>
+          <a:p>
+            <a:pPr marL="285750" indent="-285750">
+              <a:buFont typeface="Wingdings" panose="05000000000000000000" pitchFamily="2" charset="2"/>
+              <a:buChar char="q"/>
+            </a:pPr>
+            <a:r>
+              <a:rPr lang="en-US" dirty="0"/>
+              <a:t>Combined all datasets with fraud labels.</a:t>
+            </a:r>
+          </a:p>
+          <a:p>
+            <a:pPr marL="285750" indent="-285750">
+              <a:buFont typeface="Wingdings" panose="05000000000000000000" pitchFamily="2" charset="2"/>
+              <a:buChar char="q"/>
+            </a:pPr>
+            <a:endParaRPr lang="en-US" dirty="0"/>
+          </a:p>
+        </p:txBody>
+      </p:sp>
+      <p:sp>
+        <p:nvSpPr>
+          <p:cNvPr id="4" name="TextBox 3">
+            <a:extLst>
+              <a:ext uri="{FF2B5EF4-FFF2-40B4-BE49-F238E27FC236}">
+                <a16:creationId xmlns:a16="http://schemas.microsoft.com/office/drawing/2014/main" id="{DD2F982C-82E2-A7A3-46F8-856B0A7D8649}"/>
+              </a:ext>
+            </a:extLst>
+          </p:cNvPr>
+          <p:cNvSpPr txBox="1"/>
+          <p:nvPr/>
+        </p:nvSpPr>
+        <p:spPr>
+          <a:xfrm>
+            <a:off x="6248400" y="1408498"/>
+            <a:ext cx="5334000" cy="4524315"/>
+          </a:xfrm>
+          <a:prstGeom prst="rect">
+            <a:avLst/>
+          </a:prstGeom>
+          <a:noFill/>
+        </p:spPr>
+        <p:txBody>
+          <a:bodyPr wrap="square" rtlCol="0">
+            <a:spAutoFit/>
+          </a:bodyPr>
+          <a:lstStyle/>
+          <a:p>
+            <a:pPr marL="285750" indent="-285750">
+              <a:buFont typeface="Wingdings" panose="05000000000000000000" pitchFamily="2" charset="2"/>
+              <a:buChar char="q"/>
+            </a:pPr>
+            <a:r>
+              <a:rPr lang="en-US"/>
+              <a:t>Data was robust-scaled:</a:t>
+            </a:r>
+          </a:p>
+          <a:p>
+            <a:pPr marL="742950" lvl="1" indent="-285750">
+              <a:buFont typeface="Wingdings" panose="05000000000000000000" pitchFamily="2" charset="2"/>
+              <a:buChar char="§"/>
+            </a:pPr>
+            <a:r>
+              <a:rPr lang="en-US"/>
+              <a:t>Due to the inclusion of outliers</a:t>
+            </a:r>
+          </a:p>
+          <a:p>
+            <a:pPr marL="285750" indent="-285750">
+              <a:buFont typeface="Wingdings" panose="05000000000000000000" pitchFamily="2" charset="2"/>
+              <a:buChar char="q"/>
+            </a:pPr>
+            <a:r>
+              <a:rPr lang="en-US"/>
+              <a:t>Two different sets were evaluated for each model:</a:t>
+            </a:r>
+          </a:p>
+          <a:p>
+            <a:pPr marL="742950" lvl="1" indent="-285750">
+              <a:buFont typeface="Arial" panose="020B0604020202020204" pitchFamily="34" charset="0"/>
+              <a:buChar char="•"/>
+            </a:pPr>
+            <a:r>
+              <a:rPr lang="en-US"/>
+              <a:t>One using SMOTE and one using Borderline SMOTE upsampling</a:t>
+            </a:r>
+          </a:p>
+          <a:p>
+            <a:pPr marL="285750" indent="-285750">
+              <a:buFont typeface="Wingdings" panose="05000000000000000000" pitchFamily="2" charset="2"/>
+              <a:buChar char="q"/>
+            </a:pPr>
+            <a:r>
+              <a:rPr lang="en-US"/>
+              <a:t>Different model types attempted:</a:t>
+            </a:r>
+          </a:p>
+          <a:p>
+            <a:pPr marL="742950" lvl="1" indent="-285750">
+              <a:buFont typeface="Wingdings" panose="05000000000000000000" pitchFamily="2" charset="2"/>
+              <a:buChar char="§"/>
+            </a:pPr>
+            <a:r>
+              <a:rPr lang="en-US"/>
+              <a:t>Logistic Regression</a:t>
+            </a:r>
+          </a:p>
+          <a:p>
+            <a:pPr marL="742950" lvl="1" indent="-285750">
+              <a:buFont typeface="Wingdings" panose="05000000000000000000" pitchFamily="2" charset="2"/>
+              <a:buChar char="§"/>
+            </a:pPr>
+            <a:r>
+              <a:rPr lang="en-US"/>
+              <a:t>Random Forest</a:t>
+            </a:r>
+          </a:p>
+          <a:p>
+            <a:pPr marL="742950" lvl="1" indent="-285750">
+              <a:buFont typeface="Wingdings" panose="05000000000000000000" pitchFamily="2" charset="2"/>
+              <a:buChar char="§"/>
+            </a:pPr>
+            <a:r>
+              <a:rPr lang="en-US"/>
+              <a:t>Linear SVC</a:t>
+            </a:r>
+          </a:p>
+          <a:p>
+            <a:pPr marL="742950" lvl="1" indent="-285750">
+              <a:buFont typeface="Wingdings" panose="05000000000000000000" pitchFamily="2" charset="2"/>
+              <a:buChar char="§"/>
+            </a:pPr>
+            <a:r>
+              <a:rPr lang="en-US"/>
+              <a:t>ADABoost</a:t>
+            </a:r>
+          </a:p>
+          <a:p>
+            <a:pPr marL="742950" lvl="1" indent="-285750">
+              <a:buFont typeface="Wingdings" panose="05000000000000000000" pitchFamily="2" charset="2"/>
+              <a:buChar char="§"/>
+            </a:pPr>
+            <a:r>
+              <a:rPr lang="en-US"/>
+              <a:t>XGBoost</a:t>
+            </a:r>
+          </a:p>
+          <a:p>
+            <a:pPr marL="742950" lvl="1" indent="-285750">
+              <a:buFont typeface="Wingdings" panose="05000000000000000000" pitchFamily="2" charset="2"/>
+              <a:buChar char="§"/>
+            </a:pPr>
+            <a:r>
+              <a:rPr lang="en-US"/>
+              <a:t>LightGBM</a:t>
+            </a:r>
+          </a:p>
+          <a:p>
+            <a:pPr marL="285750" indent="-285750">
+              <a:buFont typeface="Wingdings" panose="05000000000000000000" pitchFamily="2" charset="2"/>
+              <a:buChar char="q"/>
+            </a:pPr>
+            <a:r>
+              <a:rPr lang="en-US"/>
+              <a:t>Hyperparameters were tuned based on the F1 metric. </a:t>
+            </a:r>
+          </a:p>
+          <a:p>
+            <a:pPr marL="285750" indent="-285750">
+              <a:buFont typeface="Wingdings" panose="05000000000000000000" pitchFamily="2" charset="2"/>
+              <a:buChar char="q"/>
+            </a:pPr>
+            <a:r>
+              <a:rPr lang="en-US"/>
+              <a:t>Final parameters are chosen by Recursive Feature Selection</a:t>
+            </a:r>
+            <a:endParaRPr lang="en-US" dirty="0"/>
+          </a:p>
+        </p:txBody>
+      </p:sp>
+    </p:spTree>
+    <p:extLst>
+      <p:ext uri="{BB962C8B-B14F-4D97-AF65-F5344CB8AC3E}">
+        <p14:creationId xmlns:p14="http://schemas.microsoft.com/office/powerpoint/2010/main" val="3720491222"/>
+      </p:ext>
+    </p:extLst>
+  </p:cSld>
+  <p:clrMapOvr>
+    <a:masterClrMapping/>
+  </p:clrMapOvr>
+</p:sld>
+</file>
+
+<file path=ppt/slides/slide7.xml><?xml version="1.0" encoding="utf-8"?>
+<p:sld xmlns:a="http://schemas.openxmlformats.org/drawingml/2006/main" xmlns:r="http://schemas.openxmlformats.org/officeDocument/2006/relationships" xmlns:p="http://schemas.openxmlformats.org/presentationml/2006/main">
+  <p:cSld>
+    <p:spTree>
+      <p:nvGrpSpPr>
+        <p:cNvPr id="1" name=""/>
+        <p:cNvGrpSpPr/>
+        <p:nvPr/>
+      </p:nvGrpSpPr>
+      <p:grpSpPr>
+        <a:xfrm>
+          <a:off x="0" y="0"/>
+          <a:ext cx="0" cy="0"/>
+          <a:chOff x="0" y="0"/>
+          <a:chExt cx="0" cy="0"/>
+        </a:xfrm>
+      </p:grpSpPr>
+      <p:sp>
+        <p:nvSpPr>
+          <p:cNvPr id="2" name="Title 1">
+            <a:extLst>
+              <a:ext uri="{FF2B5EF4-FFF2-40B4-BE49-F238E27FC236}">
+                <a16:creationId xmlns:a16="http://schemas.microsoft.com/office/drawing/2014/main" id="{E357678B-1A1A-7C0C-5FD4-FCE94B1EBC3D}"/>
+              </a:ext>
+            </a:extLst>
+          </p:cNvPr>
+          <p:cNvSpPr>
+            <a:spLocks noGrp="1"/>
+          </p:cNvSpPr>
+          <p:nvPr>
+            <p:ph type="title"/>
+          </p:nvPr>
+        </p:nvSpPr>
+        <p:spPr>
+          <a:xfrm>
+            <a:off x="313522" y="360402"/>
+            <a:ext cx="11249176" cy="663677"/>
+          </a:xfrm>
+        </p:spPr>
+        <p:txBody>
+          <a:bodyPr/>
+          <a:lstStyle/>
+          <a:p>
+            <a:r>
+              <a:rPr lang="en-US" b="1" dirty="0"/>
+              <a:t>Before we proceed…</a:t>
+            </a:r>
+          </a:p>
+        </p:txBody>
+      </p:sp>
+      <p:pic>
+        <p:nvPicPr>
+          <p:cNvPr id="4" name="Picture 3">
+            <a:extLst>
+              <a:ext uri="{FF2B5EF4-FFF2-40B4-BE49-F238E27FC236}">
+                <a16:creationId xmlns:a16="http://schemas.microsoft.com/office/drawing/2014/main" id="{ED85C09D-8BF6-16FD-1EA0-B3A20F5AAFBB}"/>
+              </a:ext>
+            </a:extLst>
+          </p:cNvPr>
+          <p:cNvPicPr>
+            <a:picLocks noChangeAspect="1"/>
+          </p:cNvPicPr>
+          <p:nvPr/>
+        </p:nvPicPr>
+        <p:blipFill>
+          <a:blip r:embed="rId3"/>
+          <a:stretch>
+            <a:fillRect/>
+          </a:stretch>
+        </p:blipFill>
+        <p:spPr>
+          <a:xfrm>
+            <a:off x="4321240" y="1880420"/>
+            <a:ext cx="3587737" cy="3097160"/>
+          </a:xfrm>
+          <a:prstGeom prst="rect">
+            <a:avLst/>
+          </a:prstGeom>
+        </p:spPr>
+      </p:pic>
+      <p:pic>
+        <p:nvPicPr>
+          <p:cNvPr id="6" name="Picture 5">
+            <a:extLst>
+              <a:ext uri="{FF2B5EF4-FFF2-40B4-BE49-F238E27FC236}">
+                <a16:creationId xmlns:a16="http://schemas.microsoft.com/office/drawing/2014/main" id="{70ED257C-811C-2957-678E-463EB3291ADF}"/>
+              </a:ext>
+            </a:extLst>
+          </p:cNvPr>
+          <p:cNvPicPr>
+            <a:picLocks noChangeAspect="1"/>
+          </p:cNvPicPr>
+          <p:nvPr/>
+        </p:nvPicPr>
+        <p:blipFill>
+          <a:blip r:embed="rId4"/>
+          <a:stretch>
+            <a:fillRect/>
+          </a:stretch>
+        </p:blipFill>
+        <p:spPr>
+          <a:xfrm>
+            <a:off x="8091873" y="1880420"/>
+            <a:ext cx="3942232" cy="3097160"/>
+          </a:xfrm>
+          <a:prstGeom prst="rect">
+            <a:avLst/>
+          </a:prstGeom>
+        </p:spPr>
+      </p:pic>
+      <p:pic>
+        <p:nvPicPr>
+          <p:cNvPr id="8" name="Picture 7">
+            <a:extLst>
+              <a:ext uri="{FF2B5EF4-FFF2-40B4-BE49-F238E27FC236}">
+                <a16:creationId xmlns:a16="http://schemas.microsoft.com/office/drawing/2014/main" id="{D77B47D8-A6ED-931E-7055-92F949E772C1}"/>
+              </a:ext>
+            </a:extLst>
+          </p:cNvPr>
+          <p:cNvPicPr>
+            <a:picLocks noChangeAspect="1"/>
+          </p:cNvPicPr>
+          <p:nvPr/>
+        </p:nvPicPr>
+        <p:blipFill>
+          <a:blip r:embed="rId5"/>
+          <a:stretch>
+            <a:fillRect/>
+          </a:stretch>
+        </p:blipFill>
+        <p:spPr>
+          <a:xfrm>
+            <a:off x="313522" y="1880420"/>
+            <a:ext cx="3824822" cy="3097160"/>
+          </a:xfrm>
+          <a:prstGeom prst="rect">
+            <a:avLst/>
+          </a:prstGeom>
+        </p:spPr>
+      </p:pic>
+      <p:sp>
+        <p:nvSpPr>
+          <p:cNvPr id="9" name="TextBox 8">
+            <a:extLst>
+              <a:ext uri="{FF2B5EF4-FFF2-40B4-BE49-F238E27FC236}">
+                <a16:creationId xmlns:a16="http://schemas.microsoft.com/office/drawing/2014/main" id="{C2639FFB-CADA-F744-7763-BA6F9BCB2618}"/>
+              </a:ext>
+            </a:extLst>
+          </p:cNvPr>
+          <p:cNvSpPr txBox="1"/>
+          <p:nvPr/>
+        </p:nvSpPr>
+        <p:spPr>
+          <a:xfrm>
+            <a:off x="313522" y="1175251"/>
+            <a:ext cx="11682365" cy="369332"/>
+          </a:xfrm>
+          <a:prstGeom prst="rect">
+            <a:avLst/>
+          </a:prstGeom>
+          <a:noFill/>
+        </p:spPr>
+        <p:txBody>
+          <a:bodyPr wrap="square" rtlCol="0">
+            <a:spAutoFit/>
+          </a:bodyPr>
+          <a:lstStyle/>
+          <a:p>
+            <a:r>
+              <a:rPr lang="en-US" dirty="0"/>
+              <a:t>Basic Patient Information:</a:t>
+            </a:r>
+          </a:p>
+        </p:txBody>
+      </p:sp>
+      <p:sp>
+        <p:nvSpPr>
+          <p:cNvPr id="10" name="TextBox 9">
+            <a:extLst>
+              <a:ext uri="{FF2B5EF4-FFF2-40B4-BE49-F238E27FC236}">
+                <a16:creationId xmlns:a16="http://schemas.microsoft.com/office/drawing/2014/main" id="{EE8FFD8F-8B25-49FD-F70D-2FE73646ABC0}"/>
+              </a:ext>
+            </a:extLst>
+          </p:cNvPr>
+          <p:cNvSpPr txBox="1"/>
+          <p:nvPr/>
+        </p:nvSpPr>
+        <p:spPr>
+          <a:xfrm>
+            <a:off x="313522" y="5279923"/>
+            <a:ext cx="11603175" cy="369332"/>
+          </a:xfrm>
+          <a:prstGeom prst="rect">
+            <a:avLst/>
+          </a:prstGeom>
+          <a:noFill/>
+        </p:spPr>
+        <p:txBody>
+          <a:bodyPr wrap="square" rtlCol="0">
+            <a:spAutoFit/>
+          </a:bodyPr>
+          <a:lstStyle/>
+          <a:p>
+            <a:pPr marL="285750" indent="-285750">
+              <a:buFont typeface="Wingdings" panose="05000000000000000000" pitchFamily="2" charset="2"/>
+              <a:buChar char="q"/>
+            </a:pPr>
+            <a:r>
+              <a:rPr lang="en-US" dirty="0"/>
+              <a:t>Most of the Beneficiaries that have Inpatient/Outpatient claims are alive.</a:t>
+            </a:r>
+          </a:p>
+        </p:txBody>
+      </p:sp>
+    </p:spTree>
+    <p:extLst>
+      <p:ext uri="{BB962C8B-B14F-4D97-AF65-F5344CB8AC3E}">
+        <p14:creationId xmlns:p14="http://schemas.microsoft.com/office/powerpoint/2010/main" val="1693661842"/>
+      </p:ext>
+    </p:extLst>
+  </p:cSld>
+  <p:clrMapOvr>
+    <a:masterClrMapping/>
+  </p:clrMapOvr>
+</p:sld>
+</file>
+
+<file path=ppt/slides/slide8.xml><?xml version="1.0" encoding="utf-8"?>
+<p:sld xmlns:a="http://schemas.openxmlformats.org/drawingml/2006/main" xmlns:r="http://schemas.openxmlformats.org/officeDocument/2006/relationships" xmlns:p="http://schemas.openxmlformats.org/presentationml/2006/main">
+  <p:cSld>
+    <p:spTree>
+      <p:nvGrpSpPr>
+        <p:cNvPr id="1" name=""/>
+        <p:cNvGrpSpPr/>
+        <p:nvPr/>
+      </p:nvGrpSpPr>
+      <p:grpSpPr>
+        <a:xfrm>
+          <a:off x="0" y="0"/>
+          <a:ext cx="0" cy="0"/>
+          <a:chOff x="0" y="0"/>
+          <a:chExt cx="0" cy="0"/>
+        </a:xfrm>
+      </p:grpSpPr>
       <p:pic>
         <p:nvPicPr>
           <p:cNvPr id="5" name="Picture 4" descr="light spots">
@@ -22898,6 +23953,15 @@
 </file>
 
 <file path=customXml/item1.xml><?xml version="1.0" encoding="utf-8"?>
+<p:properties xmlns:p="http://schemas.microsoft.com/office/2006/metadata/properties" xmlns:xsi="http://www.w3.org/2001/XMLSchema-instance" xmlns:pc="http://schemas.microsoft.com/office/infopath/2007/PartnerControls">
+  <documentManagement>
+    <Status xmlns="71af3243-3dd4-4a8d-8c0d-dd76da1f02a5">Not started</Status>
+    <MediaServiceKeyPoints xmlns="71af3243-3dd4-4a8d-8c0d-dd76da1f02a5" xsi:nil="true"/>
+  </documentManagement>
+</p:properties>
+</file>
+
+<file path=customXml/item2.xml><?xml version="1.0" encoding="utf-8"?>
 <ct:contentTypeSchema xmlns:ct="http://schemas.microsoft.com/office/2006/metadata/contentType" xmlns:ma="http://schemas.microsoft.com/office/2006/metadata/properties/metaAttributes" ct:_="" ma:_="" ma:contentTypeName="Document" ma:contentTypeID="0x01010079F111ED35F8CC479449609E8A0923A6" ma:contentTypeVersion="12" ma:contentTypeDescription="Create a new document." ma:contentTypeScope="" ma:versionID="93813dd7ca6ad654711aa0ab317e03a3">
   <xsd:schema xmlns:xsd="http://www.w3.org/2001/XMLSchema" xmlns:xs="http://www.w3.org/2001/XMLSchema" xmlns:p="http://schemas.microsoft.com/office/2006/metadata/properties" xmlns:ns2="71af3243-3dd4-4a8d-8c0d-dd76da1f02a5" xmlns:ns3="16c05727-aa75-4e4a-9b5f-8a80a1165891" targetNamespace="http://schemas.microsoft.com/office/2006/metadata/properties" ma:root="true" ma:fieldsID="f11dc0ce689dd3925e84e4e35398c6e7" ns2:_="" ns3:_="">
     <xsd:import namespace="71af3243-3dd4-4a8d-8c0d-dd76da1f02a5"/>
@@ -23118,15 +24182,6 @@
 </ct:contentTypeSchema>
 </file>
 
-<file path=customXml/item2.xml><?xml version="1.0" encoding="utf-8"?>
-<p:properties xmlns:p="http://schemas.microsoft.com/office/2006/metadata/properties" xmlns:xsi="http://www.w3.org/2001/XMLSchema-instance" xmlns:pc="http://schemas.microsoft.com/office/infopath/2007/PartnerControls">
-  <documentManagement>
-    <Status xmlns="71af3243-3dd4-4a8d-8c0d-dd76da1f02a5">Not started</Status>
-    <MediaServiceKeyPoints xmlns="71af3243-3dd4-4a8d-8c0d-dd76da1f02a5" xsi:nil="true"/>
-  </documentManagement>
-</p:properties>
-</file>
-
 <file path=customXml/item3.xml><?xml version="1.0" encoding="utf-8"?>
 <?mso-contentType ?>
 <FormTemplates xmlns="http://schemas.microsoft.com/sharepoint/v3/contenttype/forms">
@@ -23137,6 +24192,16 @@
 </file>
 
 <file path=customXml/itemProps1.xml><?xml version="1.0" encoding="utf-8"?>
+<ds:datastoreItem xmlns:ds="http://schemas.openxmlformats.org/officeDocument/2006/customXml" ds:itemID="{1F08B90B-70ED-4539-9C14-FB2728D9064F}">
+  <ds:schemaRefs>
+    <ds:schemaRef ds:uri="http://schemas.microsoft.com/office/2006/metadata/properties"/>
+    <ds:schemaRef ds:uri="http://schemas.microsoft.com/office/infopath/2007/PartnerControls"/>
+    <ds:schemaRef ds:uri="71af3243-3dd4-4a8d-8c0d-dd76da1f02a5"/>
+  </ds:schemaRefs>
+</ds:datastoreItem>
+</file>
+
+<file path=customXml/itemProps2.xml><?xml version="1.0" encoding="utf-8"?>
 <ds:datastoreItem xmlns:ds="http://schemas.openxmlformats.org/officeDocument/2006/customXml" ds:itemID="{9E8D3305-1D9D-4BC8-A40F-6F8AE50BD76B}">
   <ds:schemaRefs>
     <ds:schemaRef ds:uri="http://schemas.microsoft.com/office/2006/metadata/contentType"/>
@@ -23155,16 +24220,6 @@
 </ds:datastoreItem>
 </file>
 
-<file path=customXml/itemProps2.xml><?xml version="1.0" encoding="utf-8"?>
-<ds:datastoreItem xmlns:ds="http://schemas.openxmlformats.org/officeDocument/2006/customXml" ds:itemID="{1F08B90B-70ED-4539-9C14-FB2728D9064F}">
-  <ds:schemaRefs>
-    <ds:schemaRef ds:uri="http://schemas.microsoft.com/office/2006/metadata/properties"/>
-    <ds:schemaRef ds:uri="http://schemas.microsoft.com/office/infopath/2007/PartnerControls"/>
-    <ds:schemaRef ds:uri="71af3243-3dd4-4a8d-8c0d-dd76da1f02a5"/>
-  </ds:schemaRefs>
-</ds:datastoreItem>
-</file>
-
 <file path=customXml/itemProps3.xml><?xml version="1.0" encoding="utf-8"?>
 <ds:datastoreItem xmlns:ds="http://schemas.openxmlformats.org/officeDocument/2006/customXml" ds:itemID="{A0D51BCB-0419-432E-B7F1-25548446A625}">
   <ds:schemaRefs>

</xml_diff>